<commit_message>
edited presentation and report
</commit_message>
<xml_diff>
--- a/TestReport/Test_report_presentation.pptx
+++ b/TestReport/Test_report_presentation.pptx
@@ -5,13 +5,16 @@
     <p:sldMasterId id="2147483711" r:id="rId1"/>
   </p:sldMasterIdLst>
   <p:notesMasterIdLst>
-    <p:notesMasterId r:id="rId6"/>
+    <p:notesMasterId r:id="rId9"/>
   </p:notesMasterIdLst>
   <p:sldIdLst>
     <p:sldId id="276" r:id="rId2"/>
     <p:sldId id="282" r:id="rId3"/>
-    <p:sldId id="287" r:id="rId4"/>
-    <p:sldId id="285" r:id="rId5"/>
+    <p:sldId id="291" r:id="rId4"/>
+    <p:sldId id="287" r:id="rId5"/>
+    <p:sldId id="288" r:id="rId6"/>
+    <p:sldId id="289" r:id="rId7"/>
+    <p:sldId id="290" r:id="rId8"/>
   </p:sldIdLst>
   <p:sldSz cx="12192000" cy="6858000"/>
   <p:notesSz cx="6858000" cy="9144000"/>
@@ -212,7 +215,7 @@
           <a:p>
             <a:fld id="{3CC56FDC-94AF-49C4-8CCE-372AB5BCFEE9}" type="datetimeFigureOut">
               <a:rPr lang="en-US" smtClean="0"/>
-              <a:t>3/12/2019</a:t>
+              <a:t>3/13/2019</a:t>
             </a:fld>
             <a:endParaRPr lang="en-US" dirty="0"/>
           </a:p>
@@ -639,6 +642,353 @@
     <p:extLst>
       <p:ext uri="{BB962C8B-B14F-4D97-AF65-F5344CB8AC3E}">
         <p14:creationId xmlns:p14="http://schemas.microsoft.com/office/powerpoint/2010/main" val="313055782"/>
+      </p:ext>
+    </p:extLst>
+  </p:cSld>
+  <p:clrMapOvr>
+    <a:masterClrMapping/>
+  </p:clrMapOvr>
+</p:notes>
+</file>
+
+<file path=ppt/notesSlides/notesSlide3.xml><?xml version="1.0" encoding="utf-8"?>
+<p:notes xmlns:a="http://schemas.openxmlformats.org/drawingml/2006/main" xmlns:r="http://schemas.openxmlformats.org/officeDocument/2006/relationships" xmlns:p="http://schemas.openxmlformats.org/presentationml/2006/main">
+  <p:cSld>
+    <p:spTree>
+      <p:nvGrpSpPr>
+        <p:cNvPr id="1" name=""/>
+        <p:cNvGrpSpPr/>
+        <p:nvPr/>
+      </p:nvGrpSpPr>
+      <p:grpSpPr>
+        <a:xfrm>
+          <a:off x="0" y="0"/>
+          <a:ext cx="0" cy="0"/>
+          <a:chOff x="0" y="0"/>
+          <a:chExt cx="0" cy="0"/>
+        </a:xfrm>
+      </p:grpSpPr>
+      <p:sp>
+        <p:nvSpPr>
+          <p:cNvPr id="2" name="Folienbildplatzhalter 1"/>
+          <p:cNvSpPr>
+            <a:spLocks noGrp="1" noRot="1" noChangeAspect="1"/>
+          </p:cNvSpPr>
+          <p:nvPr>
+            <p:ph type="sldImg"/>
+          </p:nvPr>
+        </p:nvSpPr>
+        <p:spPr/>
+      </p:sp>
+      <p:sp>
+        <p:nvSpPr>
+          <p:cNvPr id="3" name="Notizenplatzhalter 2"/>
+          <p:cNvSpPr>
+            <a:spLocks noGrp="1"/>
+          </p:cNvSpPr>
+          <p:nvPr>
+            <p:ph type="body" idx="1"/>
+          </p:nvPr>
+        </p:nvSpPr>
+        <p:spPr/>
+        <p:txBody>
+          <a:bodyPr/>
+          <a:lstStyle/>
+          <a:p>
+            <a:r>
+              <a:rPr lang="de-DE" dirty="0" err="1"/>
+              <a:t>How</a:t>
+            </a:r>
+            <a:r>
+              <a:rPr lang="de-DE" dirty="0"/>
+              <a:t> </a:t>
+            </a:r>
+            <a:r>
+              <a:rPr lang="de-DE" dirty="0" err="1"/>
+              <a:t>it</a:t>
+            </a:r>
+            <a:r>
+              <a:rPr lang="de-DE" dirty="0"/>
+              <a:t> was </a:t>
+            </a:r>
+            <a:r>
+              <a:rPr lang="de-DE" dirty="0" err="1"/>
+              <a:t>fixed</a:t>
+            </a:r>
+            <a:r>
+              <a:rPr lang="de-DE" dirty="0"/>
+              <a:t>:</a:t>
+            </a:r>
+          </a:p>
+          <a:p>
+            <a:pPr marL="228600" indent="-228600">
+              <a:buAutoNum type="arabicPeriod"/>
+            </a:pPr>
+            <a:r>
+              <a:rPr lang="en-US" dirty="0"/>
+              <a:t>Changed the parameters of the string-split function</a:t>
+            </a:r>
+          </a:p>
+          <a:p>
+            <a:pPr marL="228600" indent="-228600">
+              <a:buAutoNum type="arabicPeriod"/>
+            </a:pPr>
+            <a:r>
+              <a:rPr lang="en-US" dirty="0"/>
+              <a:t>Opening config file now happens in a try-except block</a:t>
+            </a:r>
+          </a:p>
+          <a:p>
+            <a:pPr marL="228600" indent="-228600">
+              <a:buAutoNum type="arabicPeriod"/>
+            </a:pPr>
+            <a:r>
+              <a:rPr lang="en-US" dirty="0"/>
+              <a:t>Current </a:t>
+            </a:r>
+            <a:r>
+              <a:rPr lang="en-US" dirty="0" err="1"/>
+              <a:t>os</a:t>
+            </a:r>
+            <a:r>
+              <a:rPr lang="en-US" dirty="0"/>
+              <a:t> is checked at start of module</a:t>
+            </a:r>
+          </a:p>
+          <a:p>
+            <a:pPr marL="228600" indent="-228600">
+              <a:buAutoNum type="arabicPeriod"/>
+            </a:pPr>
+            <a:r>
+              <a:rPr lang="en-US" dirty="0"/>
+              <a:t>Removed static size declaration and started using the size input parameter</a:t>
+            </a:r>
+          </a:p>
+          <a:p>
+            <a:pPr marL="228600" indent="-228600">
+              <a:buAutoNum type="arabicPeriod"/>
+            </a:pPr>
+            <a:r>
+              <a:rPr lang="en-US" dirty="0"/>
+              <a:t>The configuration file got restructured and has it's default keys for each module</a:t>
+            </a:r>
+          </a:p>
+          <a:p>
+            <a:pPr marL="228600" indent="-228600">
+              <a:buAutoNum type="arabicPeriod"/>
+            </a:pPr>
+            <a:endParaRPr lang="de-DE" dirty="0"/>
+          </a:p>
+          <a:p>
+            <a:endParaRPr lang="de-DE" dirty="0"/>
+          </a:p>
+        </p:txBody>
+      </p:sp>
+      <p:sp>
+        <p:nvSpPr>
+          <p:cNvPr id="4" name="Foliennummernplatzhalter 3"/>
+          <p:cNvSpPr>
+            <a:spLocks noGrp="1"/>
+          </p:cNvSpPr>
+          <p:nvPr>
+            <p:ph type="sldNum" sz="quarter" idx="5"/>
+          </p:nvPr>
+        </p:nvSpPr>
+        <p:spPr/>
+        <p:txBody>
+          <a:bodyPr/>
+          <a:lstStyle/>
+          <a:p>
+            <a:fld id="{24D1A8A2-5E23-4C5A-A0E7-D0AE6A30F738}" type="slidenum">
+              <a:rPr lang="en-US" smtClean="0"/>
+              <a:t>5</a:t>
+            </a:fld>
+            <a:endParaRPr lang="en-US" dirty="0"/>
+          </a:p>
+        </p:txBody>
+      </p:sp>
+    </p:spTree>
+    <p:extLst>
+      <p:ext uri="{BB962C8B-B14F-4D97-AF65-F5344CB8AC3E}">
+        <p14:creationId xmlns:p14="http://schemas.microsoft.com/office/powerpoint/2010/main" val="1873595760"/>
+      </p:ext>
+    </p:extLst>
+  </p:cSld>
+  <p:clrMapOvr>
+    <a:masterClrMapping/>
+  </p:clrMapOvr>
+</p:notes>
+</file>
+
+<file path=ppt/notesSlides/notesSlide4.xml><?xml version="1.0" encoding="utf-8"?>
+<p:notes xmlns:a="http://schemas.openxmlformats.org/drawingml/2006/main" xmlns:r="http://schemas.openxmlformats.org/officeDocument/2006/relationships" xmlns:p="http://schemas.openxmlformats.org/presentationml/2006/main">
+  <p:cSld>
+    <p:spTree>
+      <p:nvGrpSpPr>
+        <p:cNvPr id="1" name=""/>
+        <p:cNvGrpSpPr/>
+        <p:nvPr/>
+      </p:nvGrpSpPr>
+      <p:grpSpPr>
+        <a:xfrm>
+          <a:off x="0" y="0"/>
+          <a:ext cx="0" cy="0"/>
+          <a:chOff x="0" y="0"/>
+          <a:chExt cx="0" cy="0"/>
+        </a:xfrm>
+      </p:grpSpPr>
+      <p:sp>
+        <p:nvSpPr>
+          <p:cNvPr id="2" name="Folienbildplatzhalter 1"/>
+          <p:cNvSpPr>
+            <a:spLocks noGrp="1" noRot="1" noChangeAspect="1"/>
+          </p:cNvSpPr>
+          <p:nvPr>
+            <p:ph type="sldImg"/>
+          </p:nvPr>
+        </p:nvSpPr>
+        <p:spPr/>
+      </p:sp>
+      <p:sp>
+        <p:nvSpPr>
+          <p:cNvPr id="3" name="Notizenplatzhalter 2"/>
+          <p:cNvSpPr>
+            <a:spLocks noGrp="1"/>
+          </p:cNvSpPr>
+          <p:nvPr>
+            <p:ph type="body" idx="1"/>
+          </p:nvPr>
+        </p:nvSpPr>
+        <p:spPr/>
+        <p:txBody>
+          <a:bodyPr/>
+          <a:lstStyle/>
+          <a:p>
+            <a:pPr marL="0" marR="0" lvl="0" indent="0" algn="l" defTabSz="914400" rtl="0" eaLnBrk="1" fontAlgn="auto" latinLnBrk="0" hangingPunct="1">
+              <a:lnSpc>
+                <a:spcPct val="100000"/>
+              </a:lnSpc>
+              <a:spcBef>
+                <a:spcPts val="0"/>
+              </a:spcBef>
+              <a:spcAft>
+                <a:spcPts val="0"/>
+              </a:spcAft>
+              <a:buClrTx/>
+              <a:buSzTx/>
+              <a:buFontTx/>
+              <a:buNone/>
+              <a:tabLst/>
+              <a:defRPr/>
+            </a:pPr>
+            <a:r>
+              <a:rPr lang="de-DE" dirty="0" err="1"/>
+              <a:t>How</a:t>
+            </a:r>
+            <a:r>
+              <a:rPr lang="de-DE" dirty="0"/>
+              <a:t> </a:t>
+            </a:r>
+            <a:r>
+              <a:rPr lang="de-DE" dirty="0" err="1"/>
+              <a:t>it</a:t>
+            </a:r>
+            <a:r>
+              <a:rPr lang="de-DE" dirty="0"/>
+              <a:t> was </a:t>
+            </a:r>
+            <a:r>
+              <a:rPr lang="de-DE" dirty="0" err="1"/>
+              <a:t>fixed</a:t>
+            </a:r>
+            <a:r>
+              <a:rPr lang="de-DE" dirty="0"/>
+              <a:t>:</a:t>
+            </a:r>
+          </a:p>
+          <a:p>
+            <a:r>
+              <a:rPr lang="de-DE" dirty="0"/>
+              <a:t>6. </a:t>
+            </a:r>
+            <a:r>
+              <a:rPr lang="en-US" dirty="0"/>
+              <a:t>Added extra check to prevent the invalid operation</a:t>
+            </a:r>
+          </a:p>
+          <a:p>
+            <a:r>
+              <a:rPr lang="en-US" dirty="0"/>
+              <a:t>7. We added the regularity check to the classifier</a:t>
+            </a:r>
+          </a:p>
+          <a:p>
+            <a:r>
+              <a:rPr lang="en-US" dirty="0"/>
+              <a:t>8. The loader now catches all errors and raises a </a:t>
+            </a:r>
+            <a:r>
+              <a:rPr lang="en-US" dirty="0" err="1"/>
+              <a:t>IOException</a:t>
+            </a:r>
+            <a:endParaRPr lang="en-US" dirty="0"/>
+          </a:p>
+          <a:p>
+            <a:r>
+              <a:rPr lang="en-US" dirty="0"/>
+              <a:t>9. The standard and error output off </a:t>
+            </a:r>
+            <a:r>
+              <a:rPr lang="en-US" dirty="0" err="1"/>
+              <a:t>Ssget</a:t>
+            </a:r>
+            <a:r>
+              <a:rPr lang="en-US" dirty="0"/>
+              <a:t> are now redirected to null</a:t>
+            </a:r>
+          </a:p>
+          <a:p>
+            <a:r>
+              <a:rPr lang="en-US" dirty="0"/>
+              <a:t>10. The accuracy was set down to a more realistic value</a:t>
+            </a:r>
+          </a:p>
+          <a:p>
+            <a:r>
+              <a:rPr lang="en-US" dirty="0"/>
+              <a:t>11. We added a method that sets a default name</a:t>
+            </a:r>
+            <a:endParaRPr lang="de-DE" dirty="0"/>
+          </a:p>
+        </p:txBody>
+      </p:sp>
+      <p:sp>
+        <p:nvSpPr>
+          <p:cNvPr id="4" name="Foliennummernplatzhalter 3"/>
+          <p:cNvSpPr>
+            <a:spLocks noGrp="1"/>
+          </p:cNvSpPr>
+          <p:nvPr>
+            <p:ph type="sldNum" sz="quarter" idx="5"/>
+          </p:nvPr>
+        </p:nvSpPr>
+        <p:spPr/>
+        <p:txBody>
+          <a:bodyPr/>
+          <a:lstStyle/>
+          <a:p>
+            <a:fld id="{24D1A8A2-5E23-4C5A-A0E7-D0AE6A30F738}" type="slidenum">
+              <a:rPr lang="en-US" smtClean="0"/>
+              <a:t>6</a:t>
+            </a:fld>
+            <a:endParaRPr lang="en-US" dirty="0"/>
+          </a:p>
+        </p:txBody>
+      </p:sp>
+    </p:spTree>
+    <p:extLst>
+      <p:ext uri="{BB962C8B-B14F-4D97-AF65-F5344CB8AC3E}">
+        <p14:creationId xmlns:p14="http://schemas.microsoft.com/office/powerpoint/2010/main" val="933150713"/>
       </p:ext>
     </p:extLst>
   </p:cSld>
@@ -1393,7 +1743,7 @@
           <a:p>
             <a:fld id="{E4FDFFB9-18E2-4EA1-B97A-6C80F6CB2F4B}" type="datetime1">
               <a:rPr lang="en-US" smtClean="0"/>
-              <a:t>3/12/2019</a:t>
+              <a:t>3/13/2019</a:t>
             </a:fld>
             <a:endParaRPr lang="en-US" dirty="0"/>
           </a:p>
@@ -1644,7 +1994,7 @@
           <a:p>
             <a:fld id="{538C6AD1-0133-4D50-885A-DB0616740B78}" type="datetime1">
               <a:rPr lang="en-US" smtClean="0"/>
-              <a:t>3/12/2019</a:t>
+              <a:t>3/13/2019</a:t>
             </a:fld>
             <a:endParaRPr lang="en-US" dirty="0"/>
           </a:p>
@@ -1958,7 +2308,7 @@
           <a:p>
             <a:fld id="{BBB600C2-3414-4625-9C57-C78C4B0BCCFC}" type="datetime1">
               <a:rPr lang="en-US" smtClean="0"/>
-              <a:t>3/12/2019</a:t>
+              <a:t>3/13/2019</a:t>
             </a:fld>
             <a:endParaRPr lang="en-US" dirty="0"/>
           </a:p>
@@ -2291,7 +2641,7 @@
           <a:p>
             <a:fld id="{DF8382F9-714E-4D45-8DD9-F9FED6016577}" type="datetime1">
               <a:rPr lang="en-US" smtClean="0"/>
-              <a:t>3/12/2019</a:t>
+              <a:t>3/13/2019</a:t>
             </a:fld>
             <a:endParaRPr lang="en-US" dirty="0"/>
           </a:p>
@@ -2605,7 +2955,7 @@
           <a:p>
             <a:fld id="{67CAB8A5-B274-487C-96BD-ED5BEE673119}" type="datetime1">
               <a:rPr lang="en-US" smtClean="0"/>
-              <a:t>3/12/2019</a:t>
+              <a:t>3/13/2019</a:t>
             </a:fld>
             <a:endParaRPr lang="en-US" dirty="0"/>
           </a:p>
@@ -2998,7 +3348,7 @@
           <a:p>
             <a:fld id="{510A4B09-17A0-4F78-B476-F64B2F5F5926}" type="datetime1">
               <a:rPr lang="en-US" smtClean="0"/>
-              <a:t>3/12/2019</a:t>
+              <a:t>3/13/2019</a:t>
             </a:fld>
             <a:endParaRPr lang="en-US" dirty="0"/>
           </a:p>
@@ -3168,7 +3518,7 @@
           <a:p>
             <a:fld id="{76296E15-4945-4016-B646-1BD034F46E31}" type="datetime1">
               <a:rPr lang="en-US" smtClean="0"/>
-              <a:t>3/12/2019</a:t>
+              <a:t>3/13/2019</a:t>
             </a:fld>
             <a:endParaRPr lang="en-US" dirty="0"/>
           </a:p>
@@ -3348,7 +3698,7 @@
           <a:p>
             <a:fld id="{9BBBCC22-8ECB-4856-9B03-F706EFF7F527}" type="datetime1">
               <a:rPr lang="en-US" smtClean="0"/>
-              <a:t>3/12/2019</a:t>
+              <a:t>3/13/2019</a:t>
             </a:fld>
             <a:endParaRPr lang="en-US" dirty="0"/>
           </a:p>
@@ -3518,7 +3868,7 @@
           <a:p>
             <a:fld id="{813FDD1C-A247-42E7-9F17-405298C5A8E2}" type="datetime1">
               <a:rPr lang="en-US" smtClean="0"/>
-              <a:t>3/12/2019</a:t>
+              <a:t>3/13/2019</a:t>
             </a:fld>
             <a:endParaRPr lang="en-US" dirty="0"/>
           </a:p>
@@ -3765,7 +4115,7 @@
           <a:p>
             <a:fld id="{EC2D8671-B4FE-43E4-9CF9-309DDD113E8B}" type="datetime1">
               <a:rPr lang="en-US" smtClean="0"/>
-              <a:t>3/12/2019</a:t>
+              <a:t>3/13/2019</a:t>
             </a:fld>
             <a:endParaRPr lang="en-US" dirty="0"/>
           </a:p>
@@ -3997,7 +4347,7 @@
           <a:p>
             <a:fld id="{13DB681E-7641-4ED1-845F-645CF236086D}" type="datetime1">
               <a:rPr lang="en-US" smtClean="0"/>
-              <a:t>3/12/2019</a:t>
+              <a:t>3/13/2019</a:t>
             </a:fld>
             <a:endParaRPr lang="en-US" dirty="0"/>
           </a:p>
@@ -4371,7 +4721,7 @@
           <a:p>
             <a:fld id="{8336604B-3724-481C-BC6C-98343040BDF1}" type="datetime1">
               <a:rPr lang="en-US" smtClean="0"/>
-              <a:t>3/12/2019</a:t>
+              <a:t>3/13/2019</a:t>
             </a:fld>
             <a:endParaRPr lang="en-US" dirty="0"/>
           </a:p>
@@ -4494,7 +4844,7 @@
           <a:p>
             <a:fld id="{0010B748-0D26-4A27-8F88-5D3B83B2191E}" type="datetime1">
               <a:rPr lang="en-US" smtClean="0"/>
-              <a:t>3/12/2019</a:t>
+              <a:t>3/13/2019</a:t>
             </a:fld>
             <a:endParaRPr lang="en-US" dirty="0"/>
           </a:p>
@@ -4589,7 +4939,7 @@
           <a:p>
             <a:fld id="{44AF75F8-E35F-4C53-8964-A01AB0B54965}" type="datetime1">
               <a:rPr lang="en-US" smtClean="0"/>
-              <a:t>3/12/2019</a:t>
+              <a:t>3/13/2019</a:t>
             </a:fld>
             <a:endParaRPr lang="en-US" dirty="0"/>
           </a:p>
@@ -4844,7 +5194,7 @@
           <a:p>
             <a:fld id="{BA574243-0F2B-4A37-B587-985DBDC0417F}" type="datetime1">
               <a:rPr lang="en-US" smtClean="0"/>
-              <a:t>3/12/2019</a:t>
+              <a:t>3/13/2019</a:t>
             </a:fld>
             <a:endParaRPr lang="en-US" dirty="0"/>
           </a:p>
@@ -5149,7 +5499,7 @@
           <a:p>
             <a:fld id="{71535B49-8E68-4A45-ADEC-92D5DA826774}" type="datetime1">
               <a:rPr lang="en-US" smtClean="0"/>
-              <a:t>3/12/2019</a:t>
+              <a:t>3/13/2019</a:t>
             </a:fld>
             <a:endParaRPr lang="en-US" dirty="0"/>
           </a:p>
@@ -5851,7 +6201,7 @@
           <a:p>
             <a:fld id="{F7A42511-B36D-43D9-9AC1-8922DE3D7232}" type="datetime1">
               <a:rPr lang="en-US" smtClean="0"/>
-              <a:t>3/12/2019</a:t>
+              <a:t>3/13/2019</a:t>
             </a:fld>
             <a:endParaRPr lang="en-US" dirty="0"/>
           </a:p>
@@ -6557,9 +6907,14 @@
           </a:xfrm>
         </p:spPr>
         <p:txBody>
-          <a:bodyPr/>
-          <a:lstStyle/>
-          <a:p>
+          <a:bodyPr>
+            <a:normAutofit fontScale="92500" lnSpcReduction="20000"/>
+          </a:bodyPr>
+          <a:lstStyle/>
+          <a:p>
+            <a:pPr marL="0" indent="0">
+              <a:buNone/>
+            </a:pPr>
             <a:r>
               <a:rPr lang="de-DE" dirty="0"/>
               <a:t>Lines </a:t>
@@ -6570,41 +6925,41 @@
             </a:r>
             <a:r>
               <a:rPr lang="de-DE" dirty="0"/>
-              <a:t> </a:t>
-            </a:r>
+              <a:t> code</a:t>
+            </a:r>
+          </a:p>
+          <a:p>
             <a:r>
               <a:rPr lang="de-DE" dirty="0" err="1"/>
               <a:t>python</a:t>
             </a:r>
             <a:r>
               <a:rPr lang="de-DE" dirty="0"/>
-              <a:t> </a:t>
-            </a:r>
+              <a:t> code: 2451</a:t>
+            </a:r>
+          </a:p>
+          <a:p>
+            <a:r>
+              <a:rPr lang="de-DE" dirty="0"/>
+              <a:t>C++ code:209</a:t>
+            </a:r>
+          </a:p>
+          <a:p>
+            <a:r>
+              <a:rPr lang="en-US" dirty="0"/>
+              <a:t>others (config and build-setup files): 192</a:t>
+            </a:r>
+          </a:p>
+          <a:p>
+            <a:pPr marL="0" indent="0">
+              <a:buNone/>
+            </a:pPr>
+            <a:endParaRPr lang="de-DE" dirty="0"/>
+          </a:p>
+          <a:p>
             <a:r>
               <a:rPr lang="de-DE" dirty="0" err="1"/>
-              <a:t>code</a:t>
-            </a:r>
-            <a:r>
-              <a:rPr lang="de-DE" dirty="0"/>
-              <a:t>: 1500</a:t>
-            </a:r>
-          </a:p>
-          <a:p>
-            <a:r>
-              <a:rPr lang="de-DE" dirty="0"/>
-              <a:t>Lines </a:t>
-            </a:r>
-            <a:r>
-              <a:rPr lang="de-DE" dirty="0" err="1"/>
-              <a:t>of</a:t>
-            </a:r>
-            <a:r>
-              <a:rPr lang="de-DE" dirty="0"/>
-              <a:t> C++ </a:t>
-            </a:r>
-            <a:r>
-              <a:rPr lang="de-DE" dirty="0" err="1"/>
-              <a:t>code</a:t>
+              <a:t>Commits</a:t>
             </a:r>
             <a:r>
               <a:rPr lang="de-DE" dirty="0"/>
@@ -6613,16 +6968,6 @@
           </a:p>
           <a:p>
             <a:r>
-              <a:rPr lang="de-DE" dirty="0" err="1"/>
-              <a:t>Commits</a:t>
-            </a:r>
-            <a:r>
-              <a:rPr lang="de-DE" dirty="0"/>
-              <a:t>: 200</a:t>
-            </a:r>
-          </a:p>
-          <a:p>
-            <a:r>
               <a:rPr lang="de-DE" dirty="0"/>
               <a:t>Test </a:t>
             </a:r>
@@ -6633,6 +6978,41 @@
             <a:r>
               <a:rPr lang="de-DE" dirty="0"/>
               <a:t>: 95%</a:t>
+            </a:r>
+          </a:p>
+          <a:p>
+            <a:pPr marL="0" indent="0">
+              <a:buNone/>
+            </a:pPr>
+            <a:endParaRPr lang="en-US" dirty="0"/>
+          </a:p>
+          <a:p>
+            <a:pPr marL="0" indent="0">
+              <a:buNone/>
+            </a:pPr>
+            <a:r>
+              <a:rPr lang="en-US" dirty="0"/>
+              <a:t>Number of tests: 63</a:t>
+            </a:r>
+          </a:p>
+          <a:p>
+            <a:r>
+              <a:rPr lang="en-US" dirty="0" err="1"/>
+              <a:t>Unittest</a:t>
+            </a:r>
+            <a:r>
+              <a:rPr lang="en-US" dirty="0"/>
+              <a:t>: 51</a:t>
+            </a:r>
+          </a:p>
+          <a:p>
+            <a:r>
+              <a:rPr lang="en-US" dirty="0" err="1"/>
+              <a:t>integrationtest</a:t>
+            </a:r>
+            <a:r>
+              <a:rPr lang="en-US" dirty="0"/>
+              <a:t>: 12</a:t>
             </a:r>
           </a:p>
           <a:p>
@@ -6704,7 +7084,7 @@
           <p:cNvPr id="2" name="Titel 1">
             <a:extLst>
               <a:ext uri="{FF2B5EF4-FFF2-40B4-BE49-F238E27FC236}">
-                <a16:creationId xmlns:a16="http://schemas.microsoft.com/office/drawing/2014/main" id="{579BF022-53B3-4D77-AD92-4C39D501C987}"/>
+                <a16:creationId xmlns:a16="http://schemas.microsoft.com/office/drawing/2014/main" id="{6F340F07-6B3D-4D1F-931B-074AABBD5339}"/>
               </a:ext>
             </a:extLst>
           </p:cNvPr>
@@ -6721,22 +7101,169 @@
           <a:lstStyle/>
           <a:p>
             <a:r>
+              <a:rPr lang="de-DE" dirty="0"/>
+              <a:t>Training </a:t>
+            </a:r>
+            <a:r>
               <a:rPr lang="de-DE" dirty="0" err="1"/>
-              <a:t>Continous</a:t>
-            </a:r>
-            <a:r>
-              <a:rPr lang="de-DE" dirty="0"/>
-              <a:t> Integration</a:t>
-            </a:r>
-          </a:p>
-        </p:txBody>
-      </p:sp>
-      <p:sp>
-        <p:nvSpPr>
-          <p:cNvPr id="3" name="Foliennummernplatzhalter 2">
+              <a:t>status</a:t>
+            </a:r>
+            <a:endParaRPr lang="de-DE" dirty="0"/>
+          </a:p>
+        </p:txBody>
+      </p:sp>
+      <p:sp>
+        <p:nvSpPr>
+          <p:cNvPr id="3" name="Inhaltsplatzhalter 2">
             <a:extLst>
               <a:ext uri="{FF2B5EF4-FFF2-40B4-BE49-F238E27FC236}">
-                <a16:creationId xmlns:a16="http://schemas.microsoft.com/office/drawing/2014/main" id="{D92B7518-7217-4064-B493-AA6D50816615}"/>
+                <a16:creationId xmlns:a16="http://schemas.microsoft.com/office/drawing/2014/main" id="{1D77C5B9-888F-425A-866D-96C84317A395}"/>
+              </a:ext>
+            </a:extLst>
+          </p:cNvPr>
+          <p:cNvSpPr>
+            <a:spLocks noGrp="1"/>
+          </p:cNvSpPr>
+          <p:nvPr>
+            <p:ph idx="1"/>
+          </p:nvPr>
+        </p:nvSpPr>
+        <p:spPr>
+          <a:xfrm>
+            <a:off x="677334" y="1572323"/>
+            <a:ext cx="8596668" cy="936701"/>
+          </a:xfrm>
+        </p:spPr>
+        <p:txBody>
+          <a:bodyPr>
+            <a:normAutofit/>
+          </a:bodyPr>
+          <a:lstStyle/>
+          <a:p>
+            <a:r>
+              <a:rPr lang="de-DE" dirty="0" err="1"/>
+              <a:t>With</a:t>
+            </a:r>
+            <a:r>
+              <a:rPr lang="de-DE" dirty="0"/>
+              <a:t> a </a:t>
+            </a:r>
+            <a:r>
+              <a:rPr lang="de-DE" dirty="0" err="1"/>
+              <a:t>balanced</a:t>
+            </a:r>
+            <a:r>
+              <a:rPr lang="de-DE" dirty="0"/>
+              <a:t> </a:t>
+            </a:r>
+            <a:r>
+              <a:rPr lang="de-DE" dirty="0" err="1"/>
+              <a:t>dataset</a:t>
+            </a:r>
+            <a:r>
+              <a:rPr lang="de-DE" dirty="0"/>
+              <a:t> </a:t>
+            </a:r>
+            <a:r>
+              <a:rPr lang="de-DE" dirty="0" err="1"/>
+              <a:t>we</a:t>
+            </a:r>
+            <a:r>
+              <a:rPr lang="de-DE" dirty="0"/>
+              <a:t> </a:t>
+            </a:r>
+            <a:r>
+              <a:rPr lang="de-DE" dirty="0" err="1"/>
+              <a:t>get</a:t>
+            </a:r>
+            <a:r>
+              <a:rPr lang="de-DE" dirty="0"/>
+              <a:t> </a:t>
+            </a:r>
+            <a:r>
+              <a:rPr lang="de-DE" dirty="0" err="1"/>
+              <a:t>approximately</a:t>
+            </a:r>
+            <a:r>
+              <a:rPr lang="de-DE" dirty="0"/>
+              <a:t> 60 % </a:t>
+            </a:r>
+            <a:r>
+              <a:rPr lang="de-DE" dirty="0" err="1"/>
+              <a:t>accuracy</a:t>
+            </a:r>
+            <a:endParaRPr lang="de-DE" dirty="0"/>
+          </a:p>
+          <a:p>
+            <a:r>
+              <a:rPr lang="de-DE" dirty="0"/>
+              <a:t>Times </a:t>
+            </a:r>
+            <a:r>
+              <a:rPr lang="de-DE" dirty="0" err="1"/>
+              <a:t>of</a:t>
+            </a:r>
+            <a:r>
+              <a:rPr lang="de-DE" dirty="0"/>
+              <a:t> </a:t>
+            </a:r>
+            <a:r>
+              <a:rPr lang="de-DE" dirty="0" err="1"/>
+              <a:t>the</a:t>
+            </a:r>
+            <a:r>
+              <a:rPr lang="de-DE" dirty="0"/>
+              <a:t> different </a:t>
+            </a:r>
+            <a:r>
+              <a:rPr lang="de-DE" dirty="0" err="1"/>
+              <a:t>solvers</a:t>
+            </a:r>
+            <a:r>
+              <a:rPr lang="de-DE" dirty="0"/>
+              <a:t> </a:t>
+            </a:r>
+            <a:r>
+              <a:rPr lang="de-DE" dirty="0" err="1"/>
+              <a:t>calculated</a:t>
+            </a:r>
+            <a:r>
+              <a:rPr lang="de-DE" dirty="0"/>
+              <a:t> </a:t>
+            </a:r>
+            <a:r>
+              <a:rPr lang="de-DE" dirty="0" err="1"/>
+              <a:t>with</a:t>
+            </a:r>
+            <a:r>
+              <a:rPr lang="de-DE" dirty="0"/>
+              <a:t> a sample </a:t>
+            </a:r>
+            <a:r>
+              <a:rPr lang="de-DE" dirty="0" err="1"/>
+              <a:t>of</a:t>
+            </a:r>
+            <a:r>
+              <a:rPr lang="de-DE" dirty="0"/>
+              <a:t> 100 000 </a:t>
+            </a:r>
+            <a:r>
+              <a:rPr lang="de-DE" dirty="0" err="1"/>
+              <a:t>matrices</a:t>
+            </a:r>
+            <a:r>
+              <a:rPr lang="de-DE" dirty="0"/>
+              <a:t>:</a:t>
+            </a:r>
+          </a:p>
+        </p:txBody>
+      </p:sp>
+      <p:sp>
+        <p:nvSpPr>
+          <p:cNvPr id="4" name="Foliennummernplatzhalter 3">
+            <a:extLst>
+              <a:ext uri="{FF2B5EF4-FFF2-40B4-BE49-F238E27FC236}">
+                <a16:creationId xmlns:a16="http://schemas.microsoft.com/office/drawing/2014/main" id="{E3DB11CD-097D-4930-8523-CB34B59F549F}"/>
               </a:ext>
             </a:extLst>
           </p:cNvPr>
@@ -6760,40 +7287,373 @@
           </a:p>
         </p:txBody>
       </p:sp>
-      <p:pic>
-        <p:nvPicPr>
-          <p:cNvPr id="4" name="Grafik 3">
+      <p:graphicFrame>
+        <p:nvGraphicFramePr>
+          <p:cNvPr id="5" name="Tabelle 4">
             <a:extLst>
               <a:ext uri="{FF2B5EF4-FFF2-40B4-BE49-F238E27FC236}">
-                <a16:creationId xmlns:a16="http://schemas.microsoft.com/office/drawing/2014/main" id="{BF967705-8ABD-49CE-854A-FDD75A1FDDAC}"/>
+                <a16:creationId xmlns:a16="http://schemas.microsoft.com/office/drawing/2014/main" id="{7FDA3763-72E5-4142-B70F-5B9C41993DDA}"/>
               </a:ext>
             </a:extLst>
           </p:cNvPr>
-          <p:cNvPicPr>
-            <a:picLocks noChangeAspect="1"/>
-          </p:cNvPicPr>
-          <p:nvPr/>
-        </p:nvPicPr>
-        <p:blipFill>
-          <a:blip r:embed="rId2"/>
-          <a:stretch>
-            <a:fillRect/>
-          </a:stretch>
-        </p:blipFill>
-        <p:spPr>
-          <a:xfrm>
-            <a:off x="0" y="2168525"/>
-            <a:ext cx="9771961" cy="3082789"/>
-          </a:xfrm>
-          <a:prstGeom prst="rect">
-            <a:avLst/>
-          </a:prstGeom>
-        </p:spPr>
-      </p:pic>
+          <p:cNvGraphicFramePr>
+            <a:graphicFrameLocks noGrp="1"/>
+          </p:cNvGraphicFramePr>
+          <p:nvPr>
+            <p:extLst>
+              <p:ext uri="{D42A27DB-BD31-4B8C-83A1-F6EECF244321}">
+                <p14:modId xmlns:p14="http://schemas.microsoft.com/office/powerpoint/2010/main" val="2494338383"/>
+              </p:ext>
+            </p:extLst>
+          </p:nvPr>
+        </p:nvGraphicFramePr>
+        <p:xfrm>
+          <a:off x="1278320" y="3133493"/>
+          <a:ext cx="7312343" cy="1854200"/>
+        </p:xfrm>
+        <a:graphic>
+          <a:graphicData uri="http://schemas.openxmlformats.org/drawingml/2006/table">
+            <a:tbl>
+              <a:tblPr firstRow="1" bandRow="1">
+                <a:tableStyleId>{5C22544A-7EE6-4342-B048-85BDC9FD1C3A}</a:tableStyleId>
+              </a:tblPr>
+              <a:tblGrid>
+                <a:gridCol w="1216343">
+                  <a:extLst>
+                    <a:ext uri="{9D8B030D-6E8A-4147-A177-3AD203B41FA5}">
+                      <a16:colId xmlns:a16="http://schemas.microsoft.com/office/drawing/2014/main" val="3711330112"/>
+                    </a:ext>
+                  </a:extLst>
+                </a:gridCol>
+                <a:gridCol w="2032000">
+                  <a:extLst>
+                    <a:ext uri="{9D8B030D-6E8A-4147-A177-3AD203B41FA5}">
+                      <a16:colId xmlns:a16="http://schemas.microsoft.com/office/drawing/2014/main" val="162999426"/>
+                    </a:ext>
+                  </a:extLst>
+                </a:gridCol>
+                <a:gridCol w="2032000">
+                  <a:extLst>
+                    <a:ext uri="{9D8B030D-6E8A-4147-A177-3AD203B41FA5}">
+                      <a16:colId xmlns:a16="http://schemas.microsoft.com/office/drawing/2014/main" val="692716869"/>
+                    </a:ext>
+                  </a:extLst>
+                </a:gridCol>
+                <a:gridCol w="2032000">
+                  <a:extLst>
+                    <a:ext uri="{9D8B030D-6E8A-4147-A177-3AD203B41FA5}">
+                      <a16:colId xmlns:a16="http://schemas.microsoft.com/office/drawing/2014/main" val="329388322"/>
+                    </a:ext>
+                  </a:extLst>
+                </a:gridCol>
+              </a:tblGrid>
+              <a:tr h="370840">
+                <a:tc>
+                  <a:txBody>
+                    <a:bodyPr/>
+                    <a:lstStyle/>
+                    <a:p>
+                      <a:r>
+                        <a:rPr lang="de-DE" dirty="0"/>
+                        <a:t>Solver</a:t>
+                      </a:r>
+                    </a:p>
+                  </a:txBody>
+                  <a:tcPr/>
+                </a:tc>
+                <a:tc>
+                  <a:txBody>
+                    <a:bodyPr/>
+                    <a:lstStyle/>
+                    <a:p>
+                      <a:r>
+                        <a:rPr lang="de-DE" dirty="0"/>
+                        <a:t>Min</a:t>
+                      </a:r>
+                    </a:p>
+                  </a:txBody>
+                  <a:tcPr/>
+                </a:tc>
+                <a:tc>
+                  <a:txBody>
+                    <a:bodyPr/>
+                    <a:lstStyle/>
+                    <a:p>
+                      <a:r>
+                        <a:rPr lang="de-DE" dirty="0"/>
+                        <a:t>Max</a:t>
+                      </a:r>
+                    </a:p>
+                  </a:txBody>
+                  <a:tcPr/>
+                </a:tc>
+                <a:tc>
+                  <a:txBody>
+                    <a:bodyPr/>
+                    <a:lstStyle/>
+                    <a:p>
+                      <a:r>
+                        <a:rPr lang="de-DE" dirty="0"/>
+                        <a:t>Mean</a:t>
+                      </a:r>
+                    </a:p>
+                  </a:txBody>
+                  <a:tcPr/>
+                </a:tc>
+                <a:extLst>
+                  <a:ext uri="{0D108BD9-81ED-4DB2-BD59-A6C34878D82A}">
+                    <a16:rowId xmlns:a16="http://schemas.microsoft.com/office/drawing/2014/main" val="3998884890"/>
+                  </a:ext>
+                </a:extLst>
+              </a:tr>
+              <a:tr h="370840">
+                <a:tc>
+                  <a:txBody>
+                    <a:bodyPr/>
+                    <a:lstStyle/>
+                    <a:p>
+                      <a:r>
+                        <a:rPr lang="de-DE" dirty="0" err="1"/>
+                        <a:t>Bigcgstab</a:t>
+                      </a:r>
+                      <a:endParaRPr lang="de-DE" dirty="0"/>
+                    </a:p>
+                  </a:txBody>
+                  <a:tcPr/>
+                </a:tc>
+                <a:tc>
+                  <a:txBody>
+                    <a:bodyPr/>
+                    <a:lstStyle/>
+                    <a:p>
+                      <a:r>
+                        <a:rPr lang="de-DE" dirty="0"/>
+                        <a:t>884</a:t>
+                      </a:r>
+                    </a:p>
+                  </a:txBody>
+                  <a:tcPr/>
+                </a:tc>
+                <a:tc>
+                  <a:txBody>
+                    <a:bodyPr/>
+                    <a:lstStyle/>
+                    <a:p>
+                      <a:r>
+                        <a:rPr lang="de-DE" dirty="0"/>
+                        <a:t>116540</a:t>
+                      </a:r>
+                    </a:p>
+                  </a:txBody>
+                  <a:tcPr/>
+                </a:tc>
+                <a:tc>
+                  <a:txBody>
+                    <a:bodyPr/>
+                    <a:lstStyle/>
+                    <a:p>
+                      <a:r>
+                        <a:rPr lang="de-DE" dirty="0"/>
+                        <a:t>19097,187</a:t>
+                      </a:r>
+                    </a:p>
+                  </a:txBody>
+                  <a:tcPr/>
+                </a:tc>
+                <a:extLst>
+                  <a:ext uri="{0D108BD9-81ED-4DB2-BD59-A6C34878D82A}">
+                    <a16:rowId xmlns:a16="http://schemas.microsoft.com/office/drawing/2014/main" val="431252872"/>
+                  </a:ext>
+                </a:extLst>
+              </a:tr>
+              <a:tr h="370840">
+                <a:tc>
+                  <a:txBody>
+                    <a:bodyPr/>
+                    <a:lstStyle/>
+                    <a:p>
+                      <a:r>
+                        <a:rPr lang="de-DE" dirty="0" err="1"/>
+                        <a:t>Cg</a:t>
+                      </a:r>
+                      <a:endParaRPr lang="de-DE" dirty="0"/>
+                    </a:p>
+                  </a:txBody>
+                  <a:tcPr/>
+                </a:tc>
+                <a:tc>
+                  <a:txBody>
+                    <a:bodyPr/>
+                    <a:lstStyle/>
+                    <a:p>
+                      <a:r>
+                        <a:rPr lang="de-DE" dirty="0"/>
+                        <a:t>802</a:t>
+                      </a:r>
+                    </a:p>
+                  </a:txBody>
+                  <a:tcPr/>
+                </a:tc>
+                <a:tc>
+                  <a:txBody>
+                    <a:bodyPr/>
+                    <a:lstStyle/>
+                    <a:p>
+                      <a:r>
+                        <a:rPr lang="de-DE" dirty="0"/>
+                        <a:t>95287</a:t>
+                      </a:r>
+                    </a:p>
+                  </a:txBody>
+                  <a:tcPr/>
+                </a:tc>
+                <a:tc>
+                  <a:txBody>
+                    <a:bodyPr/>
+                    <a:lstStyle/>
+                    <a:p>
+                      <a:r>
+                        <a:rPr lang="de-DE" dirty="0"/>
+                        <a:t>18784,856</a:t>
+                      </a:r>
+                    </a:p>
+                  </a:txBody>
+                  <a:tcPr/>
+                </a:tc>
+                <a:extLst>
+                  <a:ext uri="{0D108BD9-81ED-4DB2-BD59-A6C34878D82A}">
+                    <a16:rowId xmlns:a16="http://schemas.microsoft.com/office/drawing/2014/main" val="2935144413"/>
+                  </a:ext>
+                </a:extLst>
+              </a:tr>
+              <a:tr h="370840">
+                <a:tc>
+                  <a:txBody>
+                    <a:bodyPr/>
+                    <a:lstStyle/>
+                    <a:p>
+                      <a:r>
+                        <a:rPr lang="de-DE" dirty="0" err="1"/>
+                        <a:t>Cgs</a:t>
+                      </a:r>
+                      <a:endParaRPr lang="de-DE" dirty="0"/>
+                    </a:p>
+                  </a:txBody>
+                  <a:tcPr/>
+                </a:tc>
+                <a:tc>
+                  <a:txBody>
+                    <a:bodyPr/>
+                    <a:lstStyle/>
+                    <a:p>
+                      <a:r>
+                        <a:rPr lang="de-DE" dirty="0"/>
+                        <a:t>814</a:t>
+                      </a:r>
+                    </a:p>
+                  </a:txBody>
+                  <a:tcPr/>
+                </a:tc>
+                <a:tc>
+                  <a:txBody>
+                    <a:bodyPr/>
+                    <a:lstStyle/>
+                    <a:p>
+                      <a:r>
+                        <a:rPr lang="de-DE" dirty="0"/>
+                        <a:t>62463</a:t>
+                      </a:r>
+                    </a:p>
+                  </a:txBody>
+                  <a:tcPr/>
+                </a:tc>
+                <a:tc>
+                  <a:txBody>
+                    <a:bodyPr/>
+                    <a:lstStyle/>
+                    <a:p>
+                      <a:r>
+                        <a:rPr lang="de-DE" dirty="0"/>
+                        <a:t>11777,739</a:t>
+                      </a:r>
+                    </a:p>
+                  </a:txBody>
+                  <a:tcPr/>
+                </a:tc>
+                <a:extLst>
+                  <a:ext uri="{0D108BD9-81ED-4DB2-BD59-A6C34878D82A}">
+                    <a16:rowId xmlns:a16="http://schemas.microsoft.com/office/drawing/2014/main" val="2534040463"/>
+                  </a:ext>
+                </a:extLst>
+              </a:tr>
+              <a:tr h="370840">
+                <a:tc>
+                  <a:txBody>
+                    <a:bodyPr/>
+                    <a:lstStyle/>
+                    <a:p>
+                      <a:r>
+                        <a:rPr lang="de-DE" dirty="0" err="1"/>
+                        <a:t>Fcg</a:t>
+                      </a:r>
+                      <a:endParaRPr lang="de-DE" dirty="0"/>
+                    </a:p>
+                  </a:txBody>
+                  <a:tcPr/>
+                </a:tc>
+                <a:tc>
+                  <a:txBody>
+                    <a:bodyPr/>
+                    <a:lstStyle/>
+                    <a:p>
+                      <a:r>
+                        <a:rPr lang="de-DE" dirty="0"/>
+                        <a:t>1029</a:t>
+                      </a:r>
+                    </a:p>
+                  </a:txBody>
+                  <a:tcPr/>
+                </a:tc>
+                <a:tc>
+                  <a:txBody>
+                    <a:bodyPr/>
+                    <a:lstStyle/>
+                    <a:p>
+                      <a:r>
+                        <a:rPr lang="de-DE" dirty="0"/>
+                        <a:t>98974</a:t>
+                      </a:r>
+                    </a:p>
+                  </a:txBody>
+                  <a:tcPr/>
+                </a:tc>
+                <a:tc>
+                  <a:txBody>
+                    <a:bodyPr/>
+                    <a:lstStyle/>
+                    <a:p>
+                      <a:r>
+                        <a:rPr lang="de-DE" dirty="0"/>
+                        <a:t>20532,115</a:t>
+                      </a:r>
+                    </a:p>
+                  </a:txBody>
+                  <a:tcPr/>
+                </a:tc>
+                <a:extLst>
+                  <a:ext uri="{0D108BD9-81ED-4DB2-BD59-A6C34878D82A}">
+                    <a16:rowId xmlns:a16="http://schemas.microsoft.com/office/drawing/2014/main" val="1615283703"/>
+                  </a:ext>
+                </a:extLst>
+              </a:tr>
+            </a:tbl>
+          </a:graphicData>
+        </a:graphic>
+      </p:graphicFrame>
     </p:spTree>
     <p:extLst>
       <p:ext uri="{BB962C8B-B14F-4D97-AF65-F5344CB8AC3E}">
-        <p14:creationId xmlns:p14="http://schemas.microsoft.com/office/powerpoint/2010/main" val="2703404790"/>
+        <p14:creationId xmlns:p14="http://schemas.microsoft.com/office/powerpoint/2010/main" val="2363264956"/>
       </p:ext>
     </p:extLst>
   </p:cSld>
@@ -6825,7 +7685,7 @@
           <p:cNvPr id="2" name="Titel 1">
             <a:extLst>
               <a:ext uri="{FF2B5EF4-FFF2-40B4-BE49-F238E27FC236}">
-                <a16:creationId xmlns:a16="http://schemas.microsoft.com/office/drawing/2014/main" id="{EC6E59BC-D484-4E53-B2E1-83F3AD22B8DD}"/>
+                <a16:creationId xmlns:a16="http://schemas.microsoft.com/office/drawing/2014/main" id="{579BF022-53B3-4D77-AD92-4C39D501C987}"/>
               </a:ext>
             </a:extLst>
           </p:cNvPr>
@@ -6842,8 +7702,12 @@
           <a:lstStyle/>
           <a:p>
             <a:r>
+              <a:rPr lang="de-DE" dirty="0" err="1"/>
+              <a:t>Continous</a:t>
+            </a:r>
+            <a:r>
               <a:rPr lang="de-DE" dirty="0"/>
-              <a:t>Bugs and Fixes</a:t>
+              <a:t> Integration</a:t>
             </a:r>
           </a:p>
         </p:txBody>
@@ -6853,7 +7717,7 @@
           <p:cNvPr id="3" name="Foliennummernplatzhalter 2">
             <a:extLst>
               <a:ext uri="{FF2B5EF4-FFF2-40B4-BE49-F238E27FC236}">
-                <a16:creationId xmlns:a16="http://schemas.microsoft.com/office/drawing/2014/main" id="{66C75778-59BF-447B-AF66-CA3E99AA636C}"/>
+                <a16:creationId xmlns:a16="http://schemas.microsoft.com/office/drawing/2014/main" id="{D92B7518-7217-4064-B493-AA6D50816615}"/>
               </a:ext>
             </a:extLst>
           </p:cNvPr>
@@ -6877,10 +7741,609 @@
           </a:p>
         </p:txBody>
       </p:sp>
+      <p:pic>
+        <p:nvPicPr>
+          <p:cNvPr id="5" name="Grafik 4">
+            <a:extLst>
+              <a:ext uri="{FF2B5EF4-FFF2-40B4-BE49-F238E27FC236}">
+                <a16:creationId xmlns:a16="http://schemas.microsoft.com/office/drawing/2014/main" id="{F95C3B50-D635-4078-AFD0-5553045A8D86}"/>
+              </a:ext>
+            </a:extLst>
+          </p:cNvPr>
+          <p:cNvPicPr>
+            <a:picLocks noChangeAspect="1"/>
+          </p:cNvPicPr>
+          <p:nvPr/>
+        </p:nvPicPr>
+        <p:blipFill>
+          <a:blip r:embed="rId2"/>
+          <a:stretch>
+            <a:fillRect/>
+          </a:stretch>
+        </p:blipFill>
+        <p:spPr>
+          <a:xfrm>
+            <a:off x="186498" y="2311266"/>
+            <a:ext cx="9578340" cy="3042939"/>
+          </a:xfrm>
+          <a:prstGeom prst="rect">
+            <a:avLst/>
+          </a:prstGeom>
+        </p:spPr>
+      </p:pic>
     </p:spTree>
     <p:extLst>
       <p:ext uri="{BB962C8B-B14F-4D97-AF65-F5344CB8AC3E}">
-        <p14:creationId xmlns:p14="http://schemas.microsoft.com/office/powerpoint/2010/main" val="2919443629"/>
+        <p14:creationId xmlns:p14="http://schemas.microsoft.com/office/powerpoint/2010/main" val="2703404790"/>
+      </p:ext>
+    </p:extLst>
+  </p:cSld>
+  <p:clrMapOvr>
+    <a:masterClrMapping/>
+  </p:clrMapOvr>
+</p:sld>
+</file>
+
+<file path=ppt/slides/slide5.xml><?xml version="1.0" encoding="utf-8"?>
+<p:sld xmlns:a="http://schemas.openxmlformats.org/drawingml/2006/main" xmlns:r="http://schemas.openxmlformats.org/officeDocument/2006/relationships" xmlns:p="http://schemas.openxmlformats.org/presentationml/2006/main">
+  <p:cSld>
+    <p:spTree>
+      <p:nvGrpSpPr>
+        <p:cNvPr id="1" name=""/>
+        <p:cNvGrpSpPr/>
+        <p:nvPr/>
+      </p:nvGrpSpPr>
+      <p:grpSpPr>
+        <a:xfrm>
+          <a:off x="0" y="0"/>
+          <a:ext cx="0" cy="0"/>
+          <a:chOff x="0" y="0"/>
+          <a:chExt cx="0" cy="0"/>
+        </a:xfrm>
+      </p:grpSpPr>
+      <p:sp>
+        <p:nvSpPr>
+          <p:cNvPr id="2" name="Titel 1">
+            <a:extLst>
+              <a:ext uri="{FF2B5EF4-FFF2-40B4-BE49-F238E27FC236}">
+                <a16:creationId xmlns:a16="http://schemas.microsoft.com/office/drawing/2014/main" id="{31463064-F1D0-4EA4-B698-10CB520D9CC3}"/>
+              </a:ext>
+            </a:extLst>
+          </p:cNvPr>
+          <p:cNvSpPr>
+            <a:spLocks noGrp="1"/>
+          </p:cNvSpPr>
+          <p:nvPr>
+            <p:ph type="title"/>
+          </p:nvPr>
+        </p:nvSpPr>
+        <p:spPr>
+          <a:xfrm>
+            <a:off x="677334" y="609600"/>
+            <a:ext cx="8596668" cy="1320800"/>
+          </a:xfrm>
+        </p:spPr>
+        <p:txBody>
+          <a:bodyPr/>
+          <a:lstStyle/>
+          <a:p>
+            <a:r>
+              <a:rPr lang="de-DE" dirty="0"/>
+              <a:t>Bugs and Fixes</a:t>
+            </a:r>
+          </a:p>
+        </p:txBody>
+      </p:sp>
+      <p:sp>
+        <p:nvSpPr>
+          <p:cNvPr id="3" name="Inhaltsplatzhalter 2">
+            <a:extLst>
+              <a:ext uri="{FF2B5EF4-FFF2-40B4-BE49-F238E27FC236}">
+                <a16:creationId xmlns:a16="http://schemas.microsoft.com/office/drawing/2014/main" id="{41F82F4C-0F90-4A15-A1D5-CB8E319DAFCF}"/>
+              </a:ext>
+            </a:extLst>
+          </p:cNvPr>
+          <p:cNvSpPr>
+            <a:spLocks noGrp="1"/>
+          </p:cNvSpPr>
+          <p:nvPr>
+            <p:ph idx="1"/>
+          </p:nvPr>
+        </p:nvSpPr>
+        <p:spPr>
+          <a:xfrm>
+            <a:off x="677334" y="2160589"/>
+            <a:ext cx="8596668" cy="3880773"/>
+          </a:xfrm>
+        </p:spPr>
+        <p:txBody>
+          <a:bodyPr>
+            <a:normAutofit/>
+          </a:bodyPr>
+          <a:lstStyle/>
+          <a:p>
+            <a:r>
+              <a:rPr lang="en-US" dirty="0"/>
+              <a:t>Command line input with more than one space between arguments resulted in program crash</a:t>
+            </a:r>
+          </a:p>
+          <a:p>
+            <a:r>
+              <a:rPr lang="en-US" dirty="0"/>
+              <a:t>A corrupted configuration file caused the program to crash</a:t>
+            </a:r>
+          </a:p>
+          <a:p>
+            <a:r>
+              <a:rPr lang="en-US" dirty="0"/>
+              <a:t>Labeling or collection on operating systems other than </a:t>
+            </a:r>
+            <a:r>
+              <a:rPr lang="en-US" dirty="0" err="1"/>
+              <a:t>linux</a:t>
+            </a:r>
+            <a:r>
+              <a:rPr lang="en-US" dirty="0"/>
+              <a:t> resulted in crashes</a:t>
+            </a:r>
+          </a:p>
+          <a:p>
+            <a:r>
+              <a:rPr lang="en-US" dirty="0"/>
+              <a:t>Changing the size of the collected matrices was not possible</a:t>
+            </a:r>
+          </a:p>
+          <a:p>
+            <a:r>
+              <a:rPr lang="en-US" dirty="0"/>
+              <a:t>Default parameters are not correctly passed to the modules</a:t>
+            </a:r>
+          </a:p>
+          <a:p>
+            <a:endParaRPr lang="en-US" dirty="0"/>
+          </a:p>
+          <a:p>
+            <a:endParaRPr lang="de-DE" dirty="0"/>
+          </a:p>
+        </p:txBody>
+      </p:sp>
+      <p:sp>
+        <p:nvSpPr>
+          <p:cNvPr id="4" name="Foliennummernplatzhalter 3">
+            <a:extLst>
+              <a:ext uri="{FF2B5EF4-FFF2-40B4-BE49-F238E27FC236}">
+                <a16:creationId xmlns:a16="http://schemas.microsoft.com/office/drawing/2014/main" id="{3B53DEAA-6876-4136-ABA6-CBBD5DE463CF}"/>
+              </a:ext>
+            </a:extLst>
+          </p:cNvPr>
+          <p:cNvSpPr>
+            <a:spLocks noGrp="1"/>
+          </p:cNvSpPr>
+          <p:nvPr>
+            <p:ph type="sldNum" sz="quarter" idx="12"/>
+          </p:nvPr>
+        </p:nvSpPr>
+        <p:spPr>
+          <a:xfrm>
+            <a:off x="8590663" y="6041362"/>
+            <a:ext cx="683339" cy="365125"/>
+          </a:xfrm>
+        </p:spPr>
+        <p:txBody>
+          <a:bodyPr/>
+          <a:lstStyle/>
+          <a:p>
+            <a:fld id="{B2B8E2CE-6496-419B-95CD-C2FA6B0E2BC0}" type="slidenum">
+              <a:rPr lang="en-US" smtClean="0"/>
+              <a:t>5</a:t>
+            </a:fld>
+            <a:endParaRPr lang="en-US" dirty="0"/>
+          </a:p>
+        </p:txBody>
+      </p:sp>
+    </p:spTree>
+    <p:extLst>
+      <p:ext uri="{BB962C8B-B14F-4D97-AF65-F5344CB8AC3E}">
+        <p14:creationId xmlns:p14="http://schemas.microsoft.com/office/powerpoint/2010/main" val="4220652012"/>
+      </p:ext>
+    </p:extLst>
+  </p:cSld>
+  <p:clrMapOvr>
+    <a:masterClrMapping/>
+  </p:clrMapOvr>
+</p:sld>
+</file>
+
+<file path=ppt/slides/slide6.xml><?xml version="1.0" encoding="utf-8"?>
+<p:sld xmlns:a="http://schemas.openxmlformats.org/drawingml/2006/main" xmlns:r="http://schemas.openxmlformats.org/officeDocument/2006/relationships" xmlns:p="http://schemas.openxmlformats.org/presentationml/2006/main">
+  <p:cSld>
+    <p:spTree>
+      <p:nvGrpSpPr>
+        <p:cNvPr id="1" name=""/>
+        <p:cNvGrpSpPr/>
+        <p:nvPr/>
+      </p:nvGrpSpPr>
+      <p:grpSpPr>
+        <a:xfrm>
+          <a:off x="0" y="0"/>
+          <a:ext cx="0" cy="0"/>
+          <a:chOff x="0" y="0"/>
+          <a:chExt cx="0" cy="0"/>
+        </a:xfrm>
+      </p:grpSpPr>
+      <p:sp>
+        <p:nvSpPr>
+          <p:cNvPr id="2" name="Titel 1">
+            <a:extLst>
+              <a:ext uri="{FF2B5EF4-FFF2-40B4-BE49-F238E27FC236}">
+                <a16:creationId xmlns:a16="http://schemas.microsoft.com/office/drawing/2014/main" id="{01DC5C38-FEAF-47F9-836A-C2192E1C4598}"/>
+              </a:ext>
+            </a:extLst>
+          </p:cNvPr>
+          <p:cNvSpPr>
+            <a:spLocks noGrp="1"/>
+          </p:cNvSpPr>
+          <p:nvPr>
+            <p:ph type="title"/>
+          </p:nvPr>
+        </p:nvSpPr>
+        <p:spPr/>
+        <p:txBody>
+          <a:bodyPr/>
+          <a:lstStyle/>
+          <a:p>
+            <a:r>
+              <a:rPr lang="de-DE" dirty="0"/>
+              <a:t>Bugs and Fixes</a:t>
+            </a:r>
+          </a:p>
+        </p:txBody>
+      </p:sp>
+      <p:sp>
+        <p:nvSpPr>
+          <p:cNvPr id="3" name="Inhaltsplatzhalter 2">
+            <a:extLst>
+              <a:ext uri="{FF2B5EF4-FFF2-40B4-BE49-F238E27FC236}">
+                <a16:creationId xmlns:a16="http://schemas.microsoft.com/office/drawing/2014/main" id="{A42A1023-A01B-4986-9810-E739316E6963}"/>
+              </a:ext>
+            </a:extLst>
+          </p:cNvPr>
+          <p:cNvSpPr>
+            <a:spLocks noGrp="1"/>
+          </p:cNvSpPr>
+          <p:nvPr>
+            <p:ph idx="1"/>
+          </p:nvPr>
+        </p:nvSpPr>
+        <p:spPr/>
+        <p:txBody>
+          <a:bodyPr/>
+          <a:lstStyle/>
+          <a:p>
+            <a:r>
+              <a:rPr lang="en-US" dirty="0"/>
+              <a:t>When not entering anything, the program crashes</a:t>
+            </a:r>
+          </a:p>
+          <a:p>
+            <a:r>
+              <a:rPr lang="en-US" dirty="0"/>
+              <a:t>Passing a not regular matrix to the classifier causes unexpected behavior</a:t>
+            </a:r>
+          </a:p>
+          <a:p>
+            <a:r>
+              <a:rPr lang="en-US" dirty="0"/>
+              <a:t>Trying to open a not existing file in the loader results in a crash</a:t>
+            </a:r>
+          </a:p>
+          <a:p>
+            <a:r>
+              <a:rPr lang="en-US" dirty="0"/>
+              <a:t>Using the </a:t>
+            </a:r>
+            <a:r>
+              <a:rPr lang="en-US" dirty="0" err="1"/>
+              <a:t>Ssget</a:t>
+            </a:r>
+            <a:r>
+              <a:rPr lang="en-US" dirty="0"/>
+              <a:t> module prints unwanted messages to the command line</a:t>
+            </a:r>
+          </a:p>
+          <a:p>
+            <a:r>
+              <a:rPr lang="en-US" dirty="0"/>
+              <a:t>The labeling module was performing unexpected</a:t>
+            </a:r>
+          </a:p>
+          <a:p>
+            <a:r>
+              <a:rPr lang="en-US" dirty="0"/>
+              <a:t>Trying to enter a command without setting the -name flag results a program crashes</a:t>
+            </a:r>
+            <a:endParaRPr lang="de-DE" dirty="0"/>
+          </a:p>
+        </p:txBody>
+      </p:sp>
+      <p:sp>
+        <p:nvSpPr>
+          <p:cNvPr id="4" name="Foliennummernplatzhalter 3">
+            <a:extLst>
+              <a:ext uri="{FF2B5EF4-FFF2-40B4-BE49-F238E27FC236}">
+                <a16:creationId xmlns:a16="http://schemas.microsoft.com/office/drawing/2014/main" id="{1310AAF2-4689-4A19-A686-720DDD474012}"/>
+              </a:ext>
+            </a:extLst>
+          </p:cNvPr>
+          <p:cNvSpPr>
+            <a:spLocks noGrp="1"/>
+          </p:cNvSpPr>
+          <p:nvPr>
+            <p:ph type="sldNum" sz="quarter" idx="12"/>
+          </p:nvPr>
+        </p:nvSpPr>
+        <p:spPr/>
+        <p:txBody>
+          <a:bodyPr/>
+          <a:lstStyle/>
+          <a:p>
+            <a:fld id="{B2B8E2CE-6496-419B-95CD-C2FA6B0E2BC0}" type="slidenum">
+              <a:rPr lang="en-US" smtClean="0"/>
+              <a:t>6</a:t>
+            </a:fld>
+            <a:endParaRPr lang="en-US" dirty="0"/>
+          </a:p>
+        </p:txBody>
+      </p:sp>
+    </p:spTree>
+    <p:extLst>
+      <p:ext uri="{BB962C8B-B14F-4D97-AF65-F5344CB8AC3E}">
+        <p14:creationId xmlns:p14="http://schemas.microsoft.com/office/powerpoint/2010/main" val="13528011"/>
+      </p:ext>
+    </p:extLst>
+  </p:cSld>
+  <p:clrMapOvr>
+    <a:masterClrMapping/>
+  </p:clrMapOvr>
+</p:sld>
+</file>
+
+<file path=ppt/slides/slide7.xml><?xml version="1.0" encoding="utf-8"?>
+<p:sld xmlns:a="http://schemas.openxmlformats.org/drawingml/2006/main" xmlns:r="http://schemas.openxmlformats.org/officeDocument/2006/relationships" xmlns:p="http://schemas.openxmlformats.org/presentationml/2006/main">
+  <p:cSld>
+    <p:spTree>
+      <p:nvGrpSpPr>
+        <p:cNvPr id="1" name=""/>
+        <p:cNvGrpSpPr/>
+        <p:nvPr/>
+      </p:nvGrpSpPr>
+      <p:grpSpPr>
+        <a:xfrm>
+          <a:off x="0" y="0"/>
+          <a:ext cx="0" cy="0"/>
+          <a:chOff x="0" y="0"/>
+          <a:chExt cx="0" cy="0"/>
+        </a:xfrm>
+      </p:grpSpPr>
+      <p:sp>
+        <p:nvSpPr>
+          <p:cNvPr id="2" name="Titel 1">
+            <a:extLst>
+              <a:ext uri="{FF2B5EF4-FFF2-40B4-BE49-F238E27FC236}">
+                <a16:creationId xmlns:a16="http://schemas.microsoft.com/office/drawing/2014/main" id="{ACAE843F-FCEF-4805-BEF6-9AD6B7BCC936}"/>
+              </a:ext>
+            </a:extLst>
+          </p:cNvPr>
+          <p:cNvSpPr>
+            <a:spLocks noGrp="1"/>
+          </p:cNvSpPr>
+          <p:nvPr>
+            <p:ph type="title"/>
+          </p:nvPr>
+        </p:nvSpPr>
+        <p:spPr/>
+        <p:txBody>
+          <a:bodyPr/>
+          <a:lstStyle/>
+          <a:p>
+            <a:r>
+              <a:rPr lang="de-DE" dirty="0" err="1"/>
+              <a:t>Challenges</a:t>
+            </a:r>
+            <a:endParaRPr lang="de-DE" dirty="0"/>
+          </a:p>
+        </p:txBody>
+      </p:sp>
+      <p:sp>
+        <p:nvSpPr>
+          <p:cNvPr id="3" name="Inhaltsplatzhalter 2">
+            <a:extLst>
+              <a:ext uri="{FF2B5EF4-FFF2-40B4-BE49-F238E27FC236}">
+                <a16:creationId xmlns:a16="http://schemas.microsoft.com/office/drawing/2014/main" id="{842E8CBA-A0A4-4B52-B799-D958A41B271B}"/>
+              </a:ext>
+            </a:extLst>
+          </p:cNvPr>
+          <p:cNvSpPr>
+            <a:spLocks noGrp="1"/>
+          </p:cNvSpPr>
+          <p:nvPr>
+            <p:ph idx="1"/>
+          </p:nvPr>
+        </p:nvSpPr>
+        <p:spPr/>
+        <p:txBody>
+          <a:bodyPr>
+            <a:normAutofit/>
+          </a:bodyPr>
+          <a:lstStyle/>
+          <a:p>
+            <a:pPr marL="0" indent="0">
+              <a:buNone/>
+            </a:pPr>
+            <a:r>
+              <a:rPr lang="de-DE" dirty="0" err="1"/>
+              <a:t>Callenges</a:t>
+            </a:r>
+            <a:r>
+              <a:rPr lang="de-DE" dirty="0"/>
+              <a:t> on </a:t>
+            </a:r>
+            <a:r>
+              <a:rPr lang="de-DE" dirty="0" err="1"/>
+              <a:t>testing</a:t>
+            </a:r>
+            <a:r>
+              <a:rPr lang="de-DE" dirty="0"/>
+              <a:t> </a:t>
+            </a:r>
+            <a:r>
+              <a:rPr lang="de-DE" dirty="0" err="1"/>
+              <a:t>the</a:t>
+            </a:r>
+            <a:r>
+              <a:rPr lang="de-DE" dirty="0"/>
+              <a:t> </a:t>
+            </a:r>
+            <a:r>
+              <a:rPr lang="de-DE" dirty="0" err="1"/>
+              <a:t>modules</a:t>
+            </a:r>
+            <a:r>
+              <a:rPr lang="de-DE" dirty="0"/>
+              <a:t>:</a:t>
+            </a:r>
+          </a:p>
+          <a:p>
+            <a:pPr lvl="1"/>
+            <a:r>
+              <a:rPr lang="de-DE" sz="1800" dirty="0" err="1"/>
+              <a:t>we</a:t>
+            </a:r>
+            <a:r>
+              <a:rPr lang="de-DE" sz="1800" dirty="0"/>
+              <a:t> </a:t>
+            </a:r>
+            <a:r>
+              <a:rPr lang="de-DE" sz="1800" dirty="0" err="1"/>
+              <a:t>could</a:t>
+            </a:r>
+            <a:r>
+              <a:rPr lang="de-DE" sz="1800" dirty="0"/>
+              <a:t> not </a:t>
+            </a:r>
+            <a:r>
+              <a:rPr lang="de-DE" sz="1800" dirty="0" err="1"/>
+              <a:t>automate</a:t>
+            </a:r>
+            <a:r>
+              <a:rPr lang="de-DE" sz="1800" dirty="0"/>
+              <a:t> lots </a:t>
+            </a:r>
+            <a:r>
+              <a:rPr lang="de-DE" sz="1800" dirty="0" err="1"/>
+              <a:t>of</a:t>
+            </a:r>
+            <a:r>
+              <a:rPr lang="de-DE" sz="1800" dirty="0"/>
+              <a:t> </a:t>
+            </a:r>
+            <a:r>
+              <a:rPr lang="de-DE" sz="1800" dirty="0" err="1"/>
+              <a:t>dependecies</a:t>
+            </a:r>
+            <a:endParaRPr lang="de-DE" sz="1800" dirty="0"/>
+          </a:p>
+          <a:p>
+            <a:pPr lvl="1"/>
+            <a:r>
+              <a:rPr lang="en-US" sz="1800" dirty="0"/>
+              <a:t>most of the modules directly access the memory instead of returning something</a:t>
+            </a:r>
+            <a:endParaRPr lang="de-DE" sz="1800" dirty="0"/>
+          </a:p>
+          <a:p>
+            <a:pPr lvl="1"/>
+            <a:r>
+              <a:rPr lang="de-DE" sz="1800" dirty="0" err="1"/>
+              <a:t>Machine</a:t>
+            </a:r>
+            <a:r>
+              <a:rPr lang="de-DE" sz="1800" dirty="0"/>
+              <a:t> </a:t>
+            </a:r>
+            <a:r>
+              <a:rPr lang="de-DE" sz="1800" dirty="0" err="1"/>
+              <a:t>learning</a:t>
+            </a:r>
+            <a:r>
+              <a:rPr lang="de-DE" sz="1800" dirty="0"/>
+              <a:t> </a:t>
+            </a:r>
+            <a:r>
+              <a:rPr lang="de-DE" sz="1800" dirty="0" err="1"/>
+              <a:t>itself</a:t>
+            </a:r>
+            <a:r>
+              <a:rPr lang="de-DE" sz="1800" dirty="0"/>
+              <a:t> was </a:t>
+            </a:r>
+            <a:r>
+              <a:rPr lang="de-DE" sz="1800" dirty="0" err="1"/>
+              <a:t>hard</a:t>
+            </a:r>
+            <a:r>
+              <a:rPr lang="de-DE" sz="1800" dirty="0"/>
+              <a:t> </a:t>
+            </a:r>
+            <a:r>
+              <a:rPr lang="de-DE" sz="1800" dirty="0" err="1"/>
+              <a:t>to</a:t>
+            </a:r>
+            <a:r>
+              <a:rPr lang="de-DE" sz="1800" dirty="0"/>
+              <a:t> </a:t>
+            </a:r>
+            <a:r>
+              <a:rPr lang="de-DE" sz="1800" dirty="0" err="1"/>
+              <a:t>test</a:t>
+            </a:r>
+            <a:endParaRPr lang="de-DE" sz="1800" dirty="0"/>
+          </a:p>
+        </p:txBody>
+      </p:sp>
+      <p:sp>
+        <p:nvSpPr>
+          <p:cNvPr id="4" name="Foliennummernplatzhalter 3">
+            <a:extLst>
+              <a:ext uri="{FF2B5EF4-FFF2-40B4-BE49-F238E27FC236}">
+                <a16:creationId xmlns:a16="http://schemas.microsoft.com/office/drawing/2014/main" id="{E6FF74EF-49A5-43EE-9A07-F53CC0E8EF13}"/>
+              </a:ext>
+            </a:extLst>
+          </p:cNvPr>
+          <p:cNvSpPr>
+            <a:spLocks noGrp="1"/>
+          </p:cNvSpPr>
+          <p:nvPr>
+            <p:ph type="sldNum" sz="quarter" idx="12"/>
+          </p:nvPr>
+        </p:nvSpPr>
+        <p:spPr/>
+        <p:txBody>
+          <a:bodyPr/>
+          <a:lstStyle/>
+          <a:p>
+            <a:fld id="{B2B8E2CE-6496-419B-95CD-C2FA6B0E2BC0}" type="slidenum">
+              <a:rPr lang="en-US" smtClean="0"/>
+              <a:t>7</a:t>
+            </a:fld>
+            <a:endParaRPr lang="en-US" dirty="0"/>
+          </a:p>
+        </p:txBody>
+      </p:sp>
+    </p:spTree>
+    <p:extLst>
+      <p:ext uri="{BB962C8B-B14F-4D97-AF65-F5344CB8AC3E}">
+        <p14:creationId xmlns:p14="http://schemas.microsoft.com/office/powerpoint/2010/main" val="2347371864"/>
       </p:ext>
     </p:extLst>
   </p:cSld>

</xml_diff>

<commit_message>
edited pres and report
</commit_message>
<xml_diff>
--- a/TestReport/Test_report_presentation.pptx
+++ b/TestReport/Test_report_presentation.pptx
@@ -6997,18 +6997,14 @@
           </a:p>
           <a:p>
             <a:r>
-              <a:rPr lang="en-US" dirty="0" err="1"/>
-              <a:t>Unittest</a:t>
-            </a:r>
-            <a:r>
               <a:rPr lang="en-US" dirty="0"/>
-              <a:t>: 51</a:t>
-            </a:r>
-          </a:p>
-          <a:p>
-            <a:r>
-              <a:rPr lang="en-US" dirty="0" err="1"/>
-              <a:t>integrationtest</a:t>
+              <a:t>Unit Test: 51</a:t>
+            </a:r>
+          </a:p>
+          <a:p>
+            <a:r>
+              <a:rPr lang="en-US"/>
+              <a:t>Integration Test</a:t>
             </a:r>
             <a:r>
               <a:rPr lang="en-US" dirty="0"/>
@@ -7715,12 +7711,17 @@
           <a:p>
             <a:r>
               <a:rPr lang="de-DE" dirty="0" err="1"/>
-              <a:t>Continous</a:t>
+              <a:t>Continuous</a:t>
             </a:r>
             <a:r>
               <a:rPr lang="de-DE" dirty="0"/>
-              <a:t> Integration</a:t>
-            </a:r>
+              <a:t> </a:t>
+            </a:r>
+            <a:r>
+              <a:rPr lang="de-DE" dirty="0" err="1"/>
+              <a:t>integration</a:t>
+            </a:r>
+            <a:endParaRPr lang="de-DE" dirty="0"/>
           </a:p>
         </p:txBody>
       </p:sp>
@@ -8072,7 +8073,7 @@
           <a:p>
             <a:r>
               <a:rPr lang="en-US" dirty="0"/>
-              <a:t>Trying to enter a command without setting the -name flag results a program crashes</a:t>
+              <a:t>Trying to enter a command without setting the -name flag results a program crash</a:t>
             </a:r>
             <a:endParaRPr lang="de-DE" dirty="0"/>
           </a:p>

</xml_diff>

<commit_message>
edited pres and report 2
</commit_message>
<xml_diff>
--- a/TestReport/Test_report_presentation.pptx
+++ b/TestReport/Test_report_presentation.pptx
@@ -8073,7 +8073,15 @@
           <a:p>
             <a:r>
               <a:rPr lang="en-US" dirty="0"/>
-              <a:t>Trying to enter a command without setting the -name flag results a program crash</a:t>
+              <a:t>Trying to enter a command without setting the -name </a:t>
+            </a:r>
+            <a:r>
+              <a:rPr lang="en-US"/>
+              <a:t>flag results in </a:t>
+            </a:r>
+            <a:r>
+              <a:rPr lang="en-US" dirty="0"/>
+              <a:t>a program crash</a:t>
             </a:r>
             <a:endParaRPr lang="de-DE" dirty="0"/>
           </a:p>

</xml_diff>